<commit_message>
Various UI + Content updates
</commit_message>
<xml_diff>
--- a/Hands-on lab/images/image-source.pptx
+++ b/Hands-on lab/images/image-source.pptx
@@ -262,7 +262,7 @@
           <a:p>
             <a:fld id="{9F1BFCDA-4DF7-4C82-AD84-C667DD7FA52D}" type="datetimeFigureOut">
               <a:rPr lang="en-IE" smtClean="0"/>
-              <a:t>16/08/2019</a:t>
+              <a:t>25/05/2021</a:t>
             </a:fld>
             <a:endParaRPr lang="en-IE"/>
           </a:p>
@@ -462,7 +462,7 @@
           <a:p>
             <a:fld id="{9F1BFCDA-4DF7-4C82-AD84-C667DD7FA52D}" type="datetimeFigureOut">
               <a:rPr lang="en-IE" smtClean="0"/>
-              <a:t>16/08/2019</a:t>
+              <a:t>25/05/2021</a:t>
             </a:fld>
             <a:endParaRPr lang="en-IE"/>
           </a:p>
@@ -672,7 +672,7 @@
           <a:p>
             <a:fld id="{9F1BFCDA-4DF7-4C82-AD84-C667DD7FA52D}" type="datetimeFigureOut">
               <a:rPr lang="en-IE" smtClean="0"/>
-              <a:t>16/08/2019</a:t>
+              <a:t>25/05/2021</a:t>
             </a:fld>
             <a:endParaRPr lang="en-IE"/>
           </a:p>
@@ -872,7 +872,7 @@
           <a:p>
             <a:fld id="{9F1BFCDA-4DF7-4C82-AD84-C667DD7FA52D}" type="datetimeFigureOut">
               <a:rPr lang="en-IE" smtClean="0"/>
-              <a:t>16/08/2019</a:t>
+              <a:t>25/05/2021</a:t>
             </a:fld>
             <a:endParaRPr lang="en-IE"/>
           </a:p>
@@ -1148,7 +1148,7 @@
           <a:p>
             <a:fld id="{9F1BFCDA-4DF7-4C82-AD84-C667DD7FA52D}" type="datetimeFigureOut">
               <a:rPr lang="en-IE" smtClean="0"/>
-              <a:t>16/08/2019</a:t>
+              <a:t>25/05/2021</a:t>
             </a:fld>
             <a:endParaRPr lang="en-IE"/>
           </a:p>
@@ -1416,7 +1416,7 @@
           <a:p>
             <a:fld id="{9F1BFCDA-4DF7-4C82-AD84-C667DD7FA52D}" type="datetimeFigureOut">
               <a:rPr lang="en-IE" smtClean="0"/>
-              <a:t>16/08/2019</a:t>
+              <a:t>25/05/2021</a:t>
             </a:fld>
             <a:endParaRPr lang="en-IE"/>
           </a:p>
@@ -1831,7 +1831,7 @@
           <a:p>
             <a:fld id="{9F1BFCDA-4DF7-4C82-AD84-C667DD7FA52D}" type="datetimeFigureOut">
               <a:rPr lang="en-IE" smtClean="0"/>
-              <a:t>16/08/2019</a:t>
+              <a:t>25/05/2021</a:t>
             </a:fld>
             <a:endParaRPr lang="en-IE"/>
           </a:p>
@@ -1973,7 +1973,7 @@
           <a:p>
             <a:fld id="{9F1BFCDA-4DF7-4C82-AD84-C667DD7FA52D}" type="datetimeFigureOut">
               <a:rPr lang="en-IE" smtClean="0"/>
-              <a:t>16/08/2019</a:t>
+              <a:t>25/05/2021</a:t>
             </a:fld>
             <a:endParaRPr lang="en-IE"/>
           </a:p>
@@ -2086,7 +2086,7 @@
           <a:p>
             <a:fld id="{9F1BFCDA-4DF7-4C82-AD84-C667DD7FA52D}" type="datetimeFigureOut">
               <a:rPr lang="en-IE" smtClean="0"/>
-              <a:t>16/08/2019</a:t>
+              <a:t>25/05/2021</a:t>
             </a:fld>
             <a:endParaRPr lang="en-IE"/>
           </a:p>
@@ -2399,7 +2399,7 @@
           <a:p>
             <a:fld id="{9F1BFCDA-4DF7-4C82-AD84-C667DD7FA52D}" type="datetimeFigureOut">
               <a:rPr lang="en-IE" smtClean="0"/>
-              <a:t>16/08/2019</a:t>
+              <a:t>25/05/2021</a:t>
             </a:fld>
             <a:endParaRPr lang="en-IE"/>
           </a:p>
@@ -2688,7 +2688,7 @@
           <a:p>
             <a:fld id="{9F1BFCDA-4DF7-4C82-AD84-C667DD7FA52D}" type="datetimeFigureOut">
               <a:rPr lang="en-IE" smtClean="0"/>
-              <a:t>16/08/2019</a:t>
+              <a:t>25/05/2021</a:t>
             </a:fld>
             <a:endParaRPr lang="en-IE"/>
           </a:p>
@@ -2931,7 +2931,7 @@
           <a:p>
             <a:fld id="{9F1BFCDA-4DF7-4C82-AD84-C667DD7FA52D}" type="datetimeFigureOut">
               <a:rPr lang="en-IE" smtClean="0"/>
-              <a:t>16/08/2019</a:t>
+              <a:t>25/05/2021</a:t>
             </a:fld>
             <a:endParaRPr lang="en-IE"/>
           </a:p>
@@ -4096,8 +4096,8 @@
         </p:nvSpPr>
         <p:spPr>
           <a:xfrm>
-            <a:off x="7255818" y="1767250"/>
-            <a:ext cx="1641490" cy="3465213"/>
+            <a:off x="7255818" y="2964823"/>
+            <a:ext cx="1641490" cy="2267640"/>
           </a:xfrm>
           <a:prstGeom prst="rect">
             <a:avLst/>
@@ -4238,7 +4238,7 @@
         </p:nvSpPr>
         <p:spPr>
           <a:xfrm>
-            <a:off x="5300639" y="2942404"/>
+            <a:off x="5300639" y="3856805"/>
             <a:ext cx="2133764" cy="780290"/>
           </a:xfrm>
           <a:prstGeom prst="rightArrow">
@@ -4380,10 +4380,10 @@
       </p:pic>
       <p:pic>
         <p:nvPicPr>
-          <p:cNvPr id="11" name="Graphic 10">
-            <a:extLst>
-              <a:ext uri="{FF2B5EF4-FFF2-40B4-BE49-F238E27FC236}">
-                <a16:creationId xmlns:a16="http://schemas.microsoft.com/office/drawing/2014/main" id="{E967E7DA-ED81-4A9E-91DF-5B8055A00413}"/>
+          <p:cNvPr id="50" name="Graphic 49">
+            <a:extLst>
+              <a:ext uri="{FF2B5EF4-FFF2-40B4-BE49-F238E27FC236}">
+                <a16:creationId xmlns:a16="http://schemas.microsoft.com/office/drawing/2014/main" id="{482BF0A4-BC66-4537-8813-AC9CA1D7F2A3}"/>
               </a:ext>
             </a:extLst>
           </p:cNvPr>
@@ -4409,7 +4409,7 @@
         </p:blipFill>
         <p:spPr>
           <a:xfrm>
-            <a:off x="7697877" y="1910999"/>
+            <a:off x="7715003" y="3075922"/>
             <a:ext cx="780290" cy="780290"/>
           </a:xfrm>
           <a:prstGeom prst="rect">
@@ -4419,10 +4419,10 @@
       </p:pic>
       <p:pic>
         <p:nvPicPr>
-          <p:cNvPr id="50" name="Graphic 49">
-            <a:extLst>
-              <a:ext uri="{FF2B5EF4-FFF2-40B4-BE49-F238E27FC236}">
-                <a16:creationId xmlns:a16="http://schemas.microsoft.com/office/drawing/2014/main" id="{482BF0A4-BC66-4537-8813-AC9CA1D7F2A3}"/>
+          <p:cNvPr id="57" name="Graphic 56">
+            <a:extLst>
+              <a:ext uri="{FF2B5EF4-FFF2-40B4-BE49-F238E27FC236}">
+                <a16:creationId xmlns:a16="http://schemas.microsoft.com/office/drawing/2014/main" id="{35049E8A-D75F-4C30-ADE1-6CD172A36BBA}"/>
               </a:ext>
             </a:extLst>
           </p:cNvPr>
@@ -4448,119 +4448,8 @@
         </p:blipFill>
         <p:spPr>
           <a:xfrm>
-            <a:off x="7715003" y="3075922"/>
-            <a:ext cx="780290" cy="780290"/>
-          </a:xfrm>
-          <a:prstGeom prst="rect">
-            <a:avLst/>
-          </a:prstGeom>
-        </p:spPr>
-      </p:pic>
-      <p:pic>
-        <p:nvPicPr>
-          <p:cNvPr id="57" name="Graphic 56">
-            <a:extLst>
-              <a:ext uri="{FF2B5EF4-FFF2-40B4-BE49-F238E27FC236}">
-                <a16:creationId xmlns:a16="http://schemas.microsoft.com/office/drawing/2014/main" id="{35049E8A-D75F-4C30-ADE1-6CD172A36BBA}"/>
-              </a:ext>
-            </a:extLst>
-          </p:cNvPr>
-          <p:cNvPicPr>
-            <a:picLocks noChangeAspect="1"/>
-          </p:cNvPicPr>
-          <p:nvPr/>
-        </p:nvPicPr>
-        <p:blipFill>
-          <a:blip r:embed="rId7">
-            <a:extLst>
-              <a:ext uri="{28A0092B-C50C-407E-A947-70E740481C1C}">
-                <a14:useLocalDpi xmlns:a14="http://schemas.microsoft.com/office/drawing/2010/main" val="0"/>
-              </a:ext>
-              <a:ext uri="{96DAC541-7B7A-43D3-8B79-37D633B846F1}">
-                <asvg:svgBlip xmlns:asvg="http://schemas.microsoft.com/office/drawing/2016/SVG/main" r:embed="rId8"/>
-              </a:ext>
-            </a:extLst>
-          </a:blip>
-          <a:stretch>
-            <a:fillRect/>
-          </a:stretch>
-        </p:blipFill>
-        <p:spPr>
-          <a:xfrm>
             <a:off x="7715003" y="4210251"/>
             <a:ext cx="780290" cy="780290"/>
-          </a:xfrm>
-          <a:prstGeom prst="rect">
-            <a:avLst/>
-          </a:prstGeom>
-        </p:spPr>
-      </p:pic>
-      <p:sp>
-        <p:nvSpPr>
-          <p:cNvPr id="59" name="TextBox 58">
-            <a:extLst>
-              <a:ext uri="{FF2B5EF4-FFF2-40B4-BE49-F238E27FC236}">
-                <a16:creationId xmlns:a16="http://schemas.microsoft.com/office/drawing/2014/main" id="{EBC30BE5-3131-4217-A609-50954A205943}"/>
-              </a:ext>
-            </a:extLst>
-          </p:cNvPr>
-          <p:cNvSpPr txBox="1"/>
-          <p:nvPr/>
-        </p:nvSpPr>
-        <p:spPr>
-          <a:xfrm>
-            <a:off x="7633011" y="2717074"/>
-            <a:ext cx="944105" cy="276999"/>
-          </a:xfrm>
-          <a:prstGeom prst="rect">
-            <a:avLst/>
-          </a:prstGeom>
-          <a:noFill/>
-        </p:spPr>
-        <p:txBody>
-          <a:bodyPr wrap="none" rtlCol="0">
-            <a:spAutoFit/>
-          </a:bodyPr>
-          <a:lstStyle/>
-          <a:p>
-            <a:r>
-              <a:rPr lang="en-US" sz="1200" dirty="0" err="1"/>
-              <a:t>UbuntuWAF</a:t>
-            </a:r>
-            <a:endParaRPr lang="en-US" sz="1200" dirty="0"/>
-          </a:p>
-        </p:txBody>
-      </p:sp>
-      <p:pic>
-        <p:nvPicPr>
-          <p:cNvPr id="60" name="Picture 59">
-            <a:extLst>
-              <a:ext uri="{FF2B5EF4-FFF2-40B4-BE49-F238E27FC236}">
-                <a16:creationId xmlns:a16="http://schemas.microsoft.com/office/drawing/2014/main" id="{D062495F-1E54-4E4C-A36D-B8D3326FD90B}"/>
-              </a:ext>
-            </a:extLst>
-          </p:cNvPr>
-          <p:cNvPicPr>
-            <a:picLocks noChangeAspect="1"/>
-          </p:cNvPicPr>
-          <p:nvPr/>
-        </p:nvPicPr>
-        <p:blipFill>
-          <a:blip r:embed="rId6">
-            <a:extLst>
-              <a:ext uri="{28A0092B-C50C-407E-A947-70E740481C1C}">
-                <a14:useLocalDpi xmlns:a14="http://schemas.microsoft.com/office/drawing/2010/main" val="0"/>
-              </a:ext>
-            </a:extLst>
-          </a:blip>
-          <a:stretch>
-            <a:fillRect/>
-          </a:stretch>
-        </p:blipFill>
-        <p:spPr>
-          <a:xfrm>
-            <a:off x="7312490" y="2292269"/>
-            <a:ext cx="390147" cy="390147"/>
           </a:xfrm>
           <a:prstGeom prst="rect">
             <a:avLst/>
@@ -4644,7 +4533,7 @@
         </p:blipFill>
         <p:spPr>
           <a:xfrm>
-            <a:off x="6054515" y="2612523"/>
+            <a:off x="6054515" y="3526924"/>
             <a:ext cx="476250" cy="476250"/>
           </a:xfrm>
           <a:prstGeom prst="rect">
@@ -4760,7 +4649,7 @@
         </p:nvSpPr>
         <p:spPr>
           <a:xfrm>
-            <a:off x="5300639" y="3206189"/>
+            <a:off x="5300639" y="4120590"/>
             <a:ext cx="2099109" cy="261610"/>
           </a:xfrm>
           <a:prstGeom prst="rect">
@@ -5459,6 +5348,280 @@
           </p:txBody>
         </p:sp>
       </p:grpSp>
+      <p:sp>
+        <p:nvSpPr>
+          <p:cNvPr id="58" name="Arrow: Right 57">
+            <a:extLst>
+              <a:ext uri="{FF2B5EF4-FFF2-40B4-BE49-F238E27FC236}">
+                <a16:creationId xmlns:a16="http://schemas.microsoft.com/office/drawing/2014/main" id="{46A621C1-21D7-49E9-85EB-5E488B7B4596}"/>
+              </a:ext>
+            </a:extLst>
+          </p:cNvPr>
+          <p:cNvSpPr/>
+          <p:nvPr/>
+        </p:nvSpPr>
+        <p:spPr>
+          <a:xfrm>
+            <a:off x="5328604" y="2089020"/>
+            <a:ext cx="2133764" cy="780290"/>
+          </a:xfrm>
+          <a:prstGeom prst="rightArrow">
+            <a:avLst/>
+          </a:prstGeom>
+        </p:spPr>
+        <p:style>
+          <a:lnRef idx="2">
+            <a:schemeClr val="accent1">
+              <a:shade val="50000"/>
+            </a:schemeClr>
+          </a:lnRef>
+          <a:fillRef idx="1">
+            <a:schemeClr val="accent1"/>
+          </a:fillRef>
+          <a:effectRef idx="0">
+            <a:schemeClr val="accent1"/>
+          </a:effectRef>
+          <a:fontRef idx="minor">
+            <a:schemeClr val="lt1"/>
+          </a:fontRef>
+        </p:style>
+        <p:txBody>
+          <a:bodyPr rtlCol="0" anchor="ctr"/>
+          <a:lstStyle/>
+          <a:p>
+            <a:pPr algn="ctr"/>
+            <a:endParaRPr lang="en-US"/>
+          </a:p>
+        </p:txBody>
+      </p:sp>
+      <p:sp>
+        <p:nvSpPr>
+          <p:cNvPr id="62" name="TextBox 61">
+            <a:extLst>
+              <a:ext uri="{FF2B5EF4-FFF2-40B4-BE49-F238E27FC236}">
+                <a16:creationId xmlns:a16="http://schemas.microsoft.com/office/drawing/2014/main" id="{8D92CDA5-33A2-4EBC-9DC5-2BE3A9CB25B9}"/>
+              </a:ext>
+            </a:extLst>
+          </p:cNvPr>
+          <p:cNvSpPr txBox="1"/>
+          <p:nvPr/>
+        </p:nvSpPr>
+        <p:spPr>
+          <a:xfrm>
+            <a:off x="5328604" y="2352805"/>
+            <a:ext cx="2099109" cy="261610"/>
+          </a:xfrm>
+          <a:prstGeom prst="rect">
+            <a:avLst/>
+          </a:prstGeom>
+          <a:noFill/>
+        </p:spPr>
+        <p:txBody>
+          <a:bodyPr wrap="square" rtlCol="0">
+            <a:spAutoFit/>
+          </a:bodyPr>
+          <a:lstStyle/>
+          <a:p>
+            <a:pPr algn="ctr"/>
+            <a:r>
+              <a:rPr lang="en-US" sz="1100">
+                <a:solidFill>
+                  <a:schemeClr val="bg1"/>
+                </a:solidFill>
+              </a:rPr>
+              <a:t>Migration: Azure Firewall</a:t>
+            </a:r>
+            <a:endParaRPr lang="en-US" sz="1100" dirty="0">
+              <a:solidFill>
+                <a:schemeClr val="bg1"/>
+              </a:solidFill>
+            </a:endParaRPr>
+          </a:p>
+        </p:txBody>
+      </p:sp>
+      <p:sp>
+        <p:nvSpPr>
+          <p:cNvPr id="75" name="Rectangle 74">
+            <a:extLst>
+              <a:ext uri="{FF2B5EF4-FFF2-40B4-BE49-F238E27FC236}">
+                <a16:creationId xmlns:a16="http://schemas.microsoft.com/office/drawing/2014/main" id="{78A922F7-27FC-4DFD-93F3-406C376CB94B}"/>
+              </a:ext>
+            </a:extLst>
+          </p:cNvPr>
+          <p:cNvSpPr/>
+          <p:nvPr/>
+        </p:nvSpPr>
+        <p:spPr>
+          <a:xfrm>
+            <a:off x="7261413" y="1686009"/>
+            <a:ext cx="1627439" cy="1211295"/>
+          </a:xfrm>
+          <a:prstGeom prst="rect">
+            <a:avLst/>
+          </a:prstGeom>
+          <a:noFill/>
+          <a:ln>
+            <a:solidFill>
+              <a:schemeClr val="tx1"/>
+            </a:solidFill>
+            <a:prstDash val="dash"/>
+          </a:ln>
+        </p:spPr>
+        <p:style>
+          <a:lnRef idx="2">
+            <a:schemeClr val="accent1">
+              <a:shade val="50000"/>
+            </a:schemeClr>
+          </a:lnRef>
+          <a:fillRef idx="1">
+            <a:schemeClr val="accent1"/>
+          </a:fillRef>
+          <a:effectRef idx="0">
+            <a:schemeClr val="accent1"/>
+          </a:effectRef>
+          <a:fontRef idx="minor">
+            <a:schemeClr val="lt1"/>
+          </a:fontRef>
+        </p:style>
+        <p:txBody>
+          <a:bodyPr rtlCol="0" anchor="ctr"/>
+          <a:lstStyle/>
+          <a:p>
+            <a:pPr algn="ctr"/>
+            <a:endParaRPr lang="en-US"/>
+          </a:p>
+        </p:txBody>
+      </p:sp>
+      <p:pic>
+        <p:nvPicPr>
+          <p:cNvPr id="1026" name="Picture 2" descr="Application Gateway | Microsoft Azure Color">
+            <a:extLst>
+              <a:ext uri="{FF2B5EF4-FFF2-40B4-BE49-F238E27FC236}">
+                <a16:creationId xmlns:a16="http://schemas.microsoft.com/office/drawing/2014/main" id="{FC056698-6090-48E1-856E-5079FCFED96A}"/>
+              </a:ext>
+            </a:extLst>
+          </p:cNvPr>
+          <p:cNvPicPr>
+            <a:picLocks noChangeAspect="1" noChangeArrowheads="1"/>
+          </p:cNvPicPr>
+          <p:nvPr/>
+        </p:nvPicPr>
+        <p:blipFill>
+          <a:blip r:embed="rId21">
+            <a:extLst>
+              <a:ext uri="{28A0092B-C50C-407E-A947-70E740481C1C}">
+                <a14:useLocalDpi xmlns:a14="http://schemas.microsoft.com/office/drawing/2010/main" val="0"/>
+              </a:ext>
+            </a:extLst>
+          </a:blip>
+          <a:srcRect/>
+          <a:stretch>
+            <a:fillRect/>
+          </a:stretch>
+        </p:blipFill>
+        <p:spPr bwMode="auto">
+          <a:xfrm>
+            <a:off x="6023151" y="1745448"/>
+            <a:ext cx="510522" cy="510522"/>
+          </a:xfrm>
+          <a:prstGeom prst="rect">
+            <a:avLst/>
+          </a:prstGeom>
+          <a:noFill/>
+          <a:extLst>
+            <a:ext uri="{909E8E84-426E-40DD-AFC4-6F175D3DCCD1}">
+              <a14:hiddenFill xmlns:a14="http://schemas.microsoft.com/office/drawing/2010/main">
+                <a:solidFill>
+                  <a:srgbClr val="FFFFFF"/>
+                </a:solidFill>
+              </a14:hiddenFill>
+            </a:ext>
+          </a:extLst>
+        </p:spPr>
+      </p:pic>
+      <p:sp>
+        <p:nvSpPr>
+          <p:cNvPr id="85" name="TextBox 84">
+            <a:extLst>
+              <a:ext uri="{FF2B5EF4-FFF2-40B4-BE49-F238E27FC236}">
+                <a16:creationId xmlns:a16="http://schemas.microsoft.com/office/drawing/2014/main" id="{C4D22922-00F9-4A91-AD6E-DA38B13E5DAA}"/>
+              </a:ext>
+            </a:extLst>
+          </p:cNvPr>
+          <p:cNvSpPr txBox="1"/>
+          <p:nvPr/>
+        </p:nvSpPr>
+        <p:spPr>
+          <a:xfrm>
+            <a:off x="7462368" y="2541869"/>
+            <a:ext cx="1288098" cy="276999"/>
+          </a:xfrm>
+          <a:prstGeom prst="rect">
+            <a:avLst/>
+          </a:prstGeom>
+          <a:noFill/>
+        </p:spPr>
+        <p:txBody>
+          <a:bodyPr wrap="square" rtlCol="0">
+            <a:spAutoFit/>
+          </a:bodyPr>
+          <a:lstStyle/>
+          <a:p>
+            <a:r>
+              <a:rPr lang="en-US" sz="1200" dirty="0" err="1"/>
+              <a:t>SmartHotelWAF</a:t>
+            </a:r>
+            <a:endParaRPr lang="en-US" sz="1200" dirty="0"/>
+          </a:p>
+        </p:txBody>
+      </p:sp>
+      <p:pic>
+        <p:nvPicPr>
+          <p:cNvPr id="1028" name="Picture 4" descr="Application Gateway | Microsoft Azure Color">
+            <a:extLst>
+              <a:ext uri="{FF2B5EF4-FFF2-40B4-BE49-F238E27FC236}">
+                <a16:creationId xmlns:a16="http://schemas.microsoft.com/office/drawing/2014/main" id="{F828D8DD-1126-4EB1-9ACD-183976238A50}"/>
+              </a:ext>
+            </a:extLst>
+          </p:cNvPr>
+          <p:cNvPicPr>
+            <a:picLocks noChangeAspect="1" noChangeArrowheads="1"/>
+          </p:cNvPicPr>
+          <p:nvPr/>
+        </p:nvPicPr>
+        <p:blipFill>
+          <a:blip r:embed="rId22">
+            <a:extLst>
+              <a:ext uri="{28A0092B-C50C-407E-A947-70E740481C1C}">
+                <a14:useLocalDpi xmlns:a14="http://schemas.microsoft.com/office/drawing/2010/main" val="0"/>
+              </a:ext>
+            </a:extLst>
+          </a:blip>
+          <a:srcRect/>
+          <a:stretch>
+            <a:fillRect/>
+          </a:stretch>
+        </p:blipFill>
+        <p:spPr bwMode="auto">
+          <a:xfrm>
+            <a:off x="7675766" y="1762097"/>
+            <a:ext cx="780291" cy="780291"/>
+          </a:xfrm>
+          <a:prstGeom prst="rect">
+            <a:avLst/>
+          </a:prstGeom>
+          <a:noFill/>
+          <a:extLst>
+            <a:ext uri="{909E8E84-426E-40DD-AFC4-6F175D3DCCD1}">
+              <a14:hiddenFill xmlns:a14="http://schemas.microsoft.com/office/drawing/2010/main">
+                <a:solidFill>
+                  <a:srgbClr val="FFFFFF"/>
+                </a:solidFill>
+              </a14:hiddenFill>
+            </a:ext>
+          </a:extLst>
+        </p:spPr>
+      </p:pic>
     </p:spTree>
     <p:extLst>
       <p:ext uri="{BB962C8B-B14F-4D97-AF65-F5344CB8AC3E}">

</xml_diff>